<commit_message>
Finalized ICCS submission file. Added registration receipt. Added signed consent to publish form.
</commit_message>
<xml_diff>
--- a/Images/insitucost.pptx
+++ b/Images/insitucost.pptx
@@ -9,6 +9,8 @@
     <p:sldId id="257" r:id="rId3"/>
     <p:sldId id="258" r:id="rId4"/>
     <p:sldId id="259" r:id="rId5"/>
+    <p:sldId id="260" r:id="rId6"/>
+    <p:sldId id="261" r:id="rId7"/>
   </p:sldIdLst>
   <p:sldSz cx="12192000" cy="6858000"/>
   <p:notesSz cx="6858000" cy="9144000"/>
@@ -107,6 +109,11 @@
       </a:defRPr>
     </a:lvl9pPr>
   </p:defaultTextStyle>
+  <p:extLst>
+    <p:ext uri="{EFAFB233-063F-42B5-8137-9DF3F51BA10A}">
+      <p15:sldGuideLst xmlns:p15="http://schemas.microsoft.com/office/powerpoint/2012/main"/>
+    </p:ext>
+  </p:extLst>
 </p:presentation>
 </file>
 
@@ -257,7 +264,7 @@
           <a:p>
             <a:fld id="{4F176512-C20C-6241-AFC2-C702517270B4}" type="datetimeFigureOut">
               <a:rPr lang="en-US" smtClean="0"/>
-              <a:t>2/4/21</a:t>
+              <a:t>3/24/21</a:t>
             </a:fld>
             <a:endParaRPr lang="en-US"/>
           </a:p>
@@ -455,7 +462,7 @@
           <a:p>
             <a:fld id="{4F176512-C20C-6241-AFC2-C702517270B4}" type="datetimeFigureOut">
               <a:rPr lang="en-US" smtClean="0"/>
-              <a:t>2/4/21</a:t>
+              <a:t>3/24/21</a:t>
             </a:fld>
             <a:endParaRPr lang="en-US"/>
           </a:p>
@@ -663,7 +670,7 @@
           <a:p>
             <a:fld id="{4F176512-C20C-6241-AFC2-C702517270B4}" type="datetimeFigureOut">
               <a:rPr lang="en-US" smtClean="0"/>
-              <a:t>2/4/21</a:t>
+              <a:t>3/24/21</a:t>
             </a:fld>
             <a:endParaRPr lang="en-US"/>
           </a:p>
@@ -861,7 +868,7 @@
           <a:p>
             <a:fld id="{4F176512-C20C-6241-AFC2-C702517270B4}" type="datetimeFigureOut">
               <a:rPr lang="en-US" smtClean="0"/>
-              <a:t>2/4/21</a:t>
+              <a:t>3/24/21</a:t>
             </a:fld>
             <a:endParaRPr lang="en-US"/>
           </a:p>
@@ -1136,7 +1143,7 @@
           <a:p>
             <a:fld id="{4F176512-C20C-6241-AFC2-C702517270B4}" type="datetimeFigureOut">
               <a:rPr lang="en-US" smtClean="0"/>
-              <a:t>2/4/21</a:t>
+              <a:t>3/24/21</a:t>
             </a:fld>
             <a:endParaRPr lang="en-US"/>
           </a:p>
@@ -1401,7 +1408,7 @@
           <a:p>
             <a:fld id="{4F176512-C20C-6241-AFC2-C702517270B4}" type="datetimeFigureOut">
               <a:rPr lang="en-US" smtClean="0"/>
-              <a:t>2/4/21</a:t>
+              <a:t>3/24/21</a:t>
             </a:fld>
             <a:endParaRPr lang="en-US"/>
           </a:p>
@@ -1813,7 +1820,7 @@
           <a:p>
             <a:fld id="{4F176512-C20C-6241-AFC2-C702517270B4}" type="datetimeFigureOut">
               <a:rPr lang="en-US" smtClean="0"/>
-              <a:t>2/4/21</a:t>
+              <a:t>3/24/21</a:t>
             </a:fld>
             <a:endParaRPr lang="en-US"/>
           </a:p>
@@ -1954,7 +1961,7 @@
           <a:p>
             <a:fld id="{4F176512-C20C-6241-AFC2-C702517270B4}" type="datetimeFigureOut">
               <a:rPr lang="en-US" smtClean="0"/>
-              <a:t>2/4/21</a:t>
+              <a:t>3/24/21</a:t>
             </a:fld>
             <a:endParaRPr lang="en-US"/>
           </a:p>
@@ -2067,7 +2074,7 @@
           <a:p>
             <a:fld id="{4F176512-C20C-6241-AFC2-C702517270B4}" type="datetimeFigureOut">
               <a:rPr lang="en-US" smtClean="0"/>
-              <a:t>2/4/21</a:t>
+              <a:t>3/24/21</a:t>
             </a:fld>
             <a:endParaRPr lang="en-US"/>
           </a:p>
@@ -2378,7 +2385,7 @@
           <a:p>
             <a:fld id="{4F176512-C20C-6241-AFC2-C702517270B4}" type="datetimeFigureOut">
               <a:rPr lang="en-US" smtClean="0"/>
-              <a:t>2/4/21</a:t>
+              <a:t>3/24/21</a:t>
             </a:fld>
             <a:endParaRPr lang="en-US"/>
           </a:p>
@@ -2666,7 +2673,7 @@
           <a:p>
             <a:fld id="{4F176512-C20C-6241-AFC2-C702517270B4}" type="datetimeFigureOut">
               <a:rPr lang="en-US" smtClean="0"/>
-              <a:t>2/4/21</a:t>
+              <a:t>3/24/21</a:t>
             </a:fld>
             <a:endParaRPr lang="en-US"/>
           </a:p>
@@ -2907,7 +2914,7 @@
           <a:p>
             <a:fld id="{4F176512-C20C-6241-AFC2-C702517270B4}" type="datetimeFigureOut">
               <a:rPr lang="en-US" smtClean="0"/>
-              <a:t>2/4/21</a:t>
+              <a:t>3/24/21</a:t>
             </a:fld>
             <a:endParaRPr lang="en-US"/>
           </a:p>
@@ -4948,6 +4955,825 @@
 </p:sld>
 </file>
 
+<file path=ppt/slides/slide5.xml><?xml version="1.0" encoding="utf-8"?>
+<p:sld xmlns:a="http://schemas.openxmlformats.org/drawingml/2006/main" xmlns:r="http://schemas.openxmlformats.org/officeDocument/2006/relationships" xmlns:p="http://schemas.openxmlformats.org/presentationml/2006/main">
+  <p:cSld>
+    <p:bg>
+      <p:bgPr>
+        <a:solidFill>
+          <a:schemeClr val="bg1">
+            <a:alpha val="0"/>
+          </a:schemeClr>
+        </a:solidFill>
+        <a:effectLst/>
+      </p:bgPr>
+    </p:bg>
+    <p:spTree>
+      <p:nvGrpSpPr>
+        <p:cNvPr id="1" name=""/>
+        <p:cNvGrpSpPr/>
+        <p:nvPr/>
+      </p:nvGrpSpPr>
+      <p:grpSpPr>
+        <a:xfrm>
+          <a:off x="0" y="0"/>
+          <a:ext cx="0" cy="0"/>
+          <a:chOff x="0" y="0"/>
+          <a:chExt cx="0" cy="0"/>
+        </a:xfrm>
+      </p:grpSpPr>
+      <p:pic>
+        <p:nvPicPr>
+          <p:cNvPr id="13" name="Picture 12">
+            <a:extLst>
+              <a:ext uri="{FF2B5EF4-FFF2-40B4-BE49-F238E27FC236}">
+                <a16:creationId xmlns:a16="http://schemas.microsoft.com/office/drawing/2014/main" id="{5E851D27-22A4-CF4C-BAC1-82AD66A6F132}"/>
+              </a:ext>
+            </a:extLst>
+          </p:cNvPr>
+          <p:cNvPicPr>
+            <a:picLocks noChangeAspect="1"/>
+          </p:cNvPicPr>
+          <p:nvPr/>
+        </p:nvPicPr>
+        <p:blipFill rotWithShape="1">
+          <a:blip r:embed="rId2"/>
+          <a:srcRect l="1071" t="2162" r="2180" b="7078"/>
+          <a:stretch/>
+        </p:blipFill>
+        <p:spPr>
+          <a:xfrm>
+            <a:off x="130629" y="849085"/>
+            <a:ext cx="11795760" cy="4894811"/>
+          </a:xfrm>
+          <a:prstGeom prst="rect">
+            <a:avLst/>
+          </a:prstGeom>
+        </p:spPr>
+      </p:pic>
+      <p:sp>
+        <p:nvSpPr>
+          <p:cNvPr id="6" name="TextBox 5">
+            <a:extLst>
+              <a:ext uri="{FF2B5EF4-FFF2-40B4-BE49-F238E27FC236}">
+                <a16:creationId xmlns:a16="http://schemas.microsoft.com/office/drawing/2014/main" id="{6050F506-D7B6-8F4F-8B2A-27A68D4C65D3}"/>
+              </a:ext>
+            </a:extLst>
+          </p:cNvPr>
+          <p:cNvSpPr txBox="1"/>
+          <p:nvPr/>
+        </p:nvSpPr>
+        <p:spPr>
+          <a:xfrm>
+            <a:off x="1585485" y="1019997"/>
+            <a:ext cx="3091710" cy="1477328"/>
+          </a:xfrm>
+          <a:prstGeom prst="rect">
+            <a:avLst/>
+          </a:prstGeom>
+          <a:solidFill>
+            <a:schemeClr val="bg1">
+              <a:alpha val="50000"/>
+            </a:schemeClr>
+          </a:solidFill>
+          <a:ln>
+            <a:noFill/>
+          </a:ln>
+        </p:spPr>
+        <p:txBody>
+          <a:bodyPr wrap="square" rtlCol="0">
+            <a:spAutoFit/>
+          </a:bodyPr>
+          <a:lstStyle/>
+          <a:p>
+            <a:r>
+              <a:rPr lang="en-US" sz="1500" dirty="0">
+                <a:latin typeface="Times New Roman" panose="02020603050405020304" pitchFamily="18" charset="0"/>
+                <a:cs typeface="Times New Roman" panose="02020603050405020304" pitchFamily="18" charset="0"/>
+              </a:rPr>
+              <a:t>    SW4 (64 Nodes, 665M)</a:t>
+            </a:r>
+          </a:p>
+          <a:p>
+            <a:r>
+              <a:rPr lang="en-US" sz="1500" baseline="30000" dirty="0">
+                <a:latin typeface="Times New Roman" panose="02020603050405020304" pitchFamily="18" charset="0"/>
+                <a:cs typeface="Times New Roman" panose="02020603050405020304" pitchFamily="18" charset="0"/>
+              </a:rPr>
+              <a:t>      </a:t>
+            </a:r>
+            <a:r>
+              <a:rPr lang="en-US" sz="1500" dirty="0">
+                <a:latin typeface="Times New Roman" panose="02020603050405020304" pitchFamily="18" charset="0"/>
+                <a:cs typeface="Times New Roman" panose="02020603050405020304" pitchFamily="18" charset="0"/>
+              </a:rPr>
+              <a:t>SW4 (64 Nodes, 276M)</a:t>
+            </a:r>
+            <a:endParaRPr lang="en-US" sz="1500" baseline="30000" dirty="0">
+              <a:latin typeface="Times New Roman" panose="02020603050405020304" pitchFamily="18" charset="0"/>
+              <a:cs typeface="Times New Roman" panose="02020603050405020304" pitchFamily="18" charset="0"/>
+            </a:endParaRPr>
+          </a:p>
+          <a:p>
+            <a:r>
+              <a:rPr lang="en-US" sz="1500" dirty="0">
+                <a:latin typeface="Times New Roman" panose="02020603050405020304" pitchFamily="18" charset="0"/>
+                <a:cs typeface="Times New Roman" panose="02020603050405020304" pitchFamily="18" charset="0"/>
+              </a:rPr>
+              <a:t>    SW4 (1 Node, 4.4M)</a:t>
+            </a:r>
+          </a:p>
+          <a:p>
+            <a:r>
+              <a:rPr lang="en-US" sz="1500" baseline="30000" dirty="0">
+                <a:latin typeface="Times New Roman" panose="02020603050405020304" pitchFamily="18" charset="0"/>
+                <a:cs typeface="Times New Roman" panose="02020603050405020304" pitchFamily="18" charset="0"/>
+              </a:rPr>
+              <a:t>      </a:t>
+            </a:r>
+            <a:r>
+              <a:rPr lang="en-US" sz="1500" dirty="0">
+                <a:latin typeface="Times New Roman" panose="02020603050405020304" pitchFamily="18" charset="0"/>
+                <a:cs typeface="Times New Roman" panose="02020603050405020304" pitchFamily="18" charset="0"/>
+              </a:rPr>
+              <a:t>Nyx  (1 Node, 2.1M)</a:t>
+            </a:r>
+          </a:p>
+          <a:p>
+            <a:r>
+              <a:rPr lang="en-US" sz="1500" dirty="0">
+                <a:latin typeface="Times New Roman" panose="02020603050405020304" pitchFamily="18" charset="0"/>
+                <a:cs typeface="Times New Roman" panose="02020603050405020304" pitchFamily="18" charset="0"/>
+              </a:rPr>
+              <a:t>    Nyx  (1 Node, 328k)</a:t>
+            </a:r>
+          </a:p>
+          <a:p>
+            <a:r>
+              <a:rPr lang="en-US" sz="1500" dirty="0">
+                <a:latin typeface="Times New Roman" panose="02020603050405020304" pitchFamily="18" charset="0"/>
+                <a:cs typeface="Times New Roman" panose="02020603050405020304" pitchFamily="18" charset="0"/>
+              </a:rPr>
+              <a:t>    Cloverleaf3D (16 Nodes, 201M)</a:t>
+            </a:r>
+          </a:p>
+        </p:txBody>
+      </p:sp>
+      <p:sp>
+        <p:nvSpPr>
+          <p:cNvPr id="7" name="Diamond 6">
+            <a:extLst>
+              <a:ext uri="{FF2B5EF4-FFF2-40B4-BE49-F238E27FC236}">
+                <a16:creationId xmlns:a16="http://schemas.microsoft.com/office/drawing/2014/main" id="{1ECCE601-238B-4349-A5C9-07D83DFCC1A4}"/>
+              </a:ext>
+            </a:extLst>
+          </p:cNvPr>
+          <p:cNvSpPr/>
+          <p:nvPr/>
+        </p:nvSpPr>
+        <p:spPr>
+          <a:xfrm>
+            <a:off x="1628571" y="1114103"/>
+            <a:ext cx="146304" cy="146304"/>
+          </a:xfrm>
+          <a:prstGeom prst="diamond">
+            <a:avLst/>
+          </a:prstGeom>
+          <a:solidFill>
+            <a:srgbClr val="C00000"/>
+          </a:solidFill>
+          <a:ln>
+            <a:solidFill>
+              <a:srgbClr val="C00000"/>
+            </a:solidFill>
+          </a:ln>
+        </p:spPr>
+        <p:style>
+          <a:lnRef idx="2">
+            <a:schemeClr val="accent1">
+              <a:shade val="50000"/>
+            </a:schemeClr>
+          </a:lnRef>
+          <a:fillRef idx="1">
+            <a:schemeClr val="accent1"/>
+          </a:fillRef>
+          <a:effectRef idx="0">
+            <a:schemeClr val="accent1"/>
+          </a:effectRef>
+          <a:fontRef idx="minor">
+            <a:schemeClr val="lt1"/>
+          </a:fontRef>
+        </p:style>
+        <p:txBody>
+          <a:bodyPr rtlCol="0" anchor="ctr"/>
+          <a:lstStyle/>
+          <a:p>
+            <a:pPr algn="ctr"/>
+            <a:endParaRPr lang="en-US"/>
+          </a:p>
+        </p:txBody>
+      </p:sp>
+      <p:sp>
+        <p:nvSpPr>
+          <p:cNvPr id="8" name="Triangle 7">
+            <a:extLst>
+              <a:ext uri="{FF2B5EF4-FFF2-40B4-BE49-F238E27FC236}">
+                <a16:creationId xmlns:a16="http://schemas.microsoft.com/office/drawing/2014/main" id="{27AAD3CE-A060-FD4D-9A46-9D65BC4F9750}"/>
+              </a:ext>
+            </a:extLst>
+          </p:cNvPr>
+          <p:cNvSpPr/>
+          <p:nvPr/>
+        </p:nvSpPr>
+        <p:spPr>
+          <a:xfrm>
+            <a:off x="1638290" y="1334241"/>
+            <a:ext cx="128016" cy="146304"/>
+          </a:xfrm>
+          <a:prstGeom prst="triangle">
+            <a:avLst/>
+          </a:prstGeom>
+          <a:solidFill>
+            <a:srgbClr val="C00000"/>
+          </a:solidFill>
+          <a:ln>
+            <a:solidFill>
+              <a:srgbClr val="C00000"/>
+            </a:solidFill>
+          </a:ln>
+        </p:spPr>
+        <p:style>
+          <a:lnRef idx="2">
+            <a:schemeClr val="accent1">
+              <a:shade val="50000"/>
+            </a:schemeClr>
+          </a:lnRef>
+          <a:fillRef idx="1">
+            <a:schemeClr val="accent1"/>
+          </a:fillRef>
+          <a:effectRef idx="0">
+            <a:schemeClr val="accent1"/>
+          </a:effectRef>
+          <a:fontRef idx="minor">
+            <a:schemeClr val="lt1"/>
+          </a:fontRef>
+        </p:style>
+        <p:txBody>
+          <a:bodyPr rtlCol="0" anchor="ctr"/>
+          <a:lstStyle/>
+          <a:p>
+            <a:pPr algn="ctr"/>
+            <a:endParaRPr lang="en-US"/>
+          </a:p>
+        </p:txBody>
+      </p:sp>
+      <p:sp>
+        <p:nvSpPr>
+          <p:cNvPr id="9" name="Oval 8">
+            <a:extLst>
+              <a:ext uri="{FF2B5EF4-FFF2-40B4-BE49-F238E27FC236}">
+                <a16:creationId xmlns:a16="http://schemas.microsoft.com/office/drawing/2014/main" id="{0B6A8EAB-44CF-A749-A002-CE3FE24F66F8}"/>
+              </a:ext>
+            </a:extLst>
+          </p:cNvPr>
+          <p:cNvSpPr/>
+          <p:nvPr/>
+        </p:nvSpPr>
+        <p:spPr>
+          <a:xfrm>
+            <a:off x="1628571" y="1569272"/>
+            <a:ext cx="146304" cy="146304"/>
+          </a:xfrm>
+          <a:prstGeom prst="ellipse">
+            <a:avLst/>
+          </a:prstGeom>
+          <a:solidFill>
+            <a:schemeClr val="accent2">
+              <a:lumMod val="60000"/>
+              <a:lumOff val="40000"/>
+            </a:schemeClr>
+          </a:solidFill>
+          <a:ln>
+            <a:solidFill>
+              <a:schemeClr val="accent2">
+                <a:lumMod val="60000"/>
+                <a:lumOff val="40000"/>
+              </a:schemeClr>
+            </a:solidFill>
+          </a:ln>
+        </p:spPr>
+        <p:style>
+          <a:lnRef idx="2">
+            <a:schemeClr val="accent1">
+              <a:shade val="50000"/>
+            </a:schemeClr>
+          </a:lnRef>
+          <a:fillRef idx="1">
+            <a:schemeClr val="accent1"/>
+          </a:fillRef>
+          <a:effectRef idx="0">
+            <a:schemeClr val="accent1"/>
+          </a:effectRef>
+          <a:fontRef idx="minor">
+            <a:schemeClr val="lt1"/>
+          </a:fontRef>
+        </p:style>
+        <p:txBody>
+          <a:bodyPr rtlCol="0" anchor="ctr"/>
+          <a:lstStyle/>
+          <a:p>
+            <a:pPr algn="ctr"/>
+            <a:endParaRPr lang="en-US"/>
+          </a:p>
+        </p:txBody>
+      </p:sp>
+      <p:sp>
+        <p:nvSpPr>
+          <p:cNvPr id="10" name="Diamond 9">
+            <a:extLst>
+              <a:ext uri="{FF2B5EF4-FFF2-40B4-BE49-F238E27FC236}">
+                <a16:creationId xmlns:a16="http://schemas.microsoft.com/office/drawing/2014/main" id="{65CA3ABD-7F14-3945-B885-B6B5079618F4}"/>
+              </a:ext>
+            </a:extLst>
+          </p:cNvPr>
+          <p:cNvSpPr/>
+          <p:nvPr/>
+        </p:nvSpPr>
+        <p:spPr>
+          <a:xfrm>
+            <a:off x="1628571" y="1794080"/>
+            <a:ext cx="146304" cy="146304"/>
+          </a:xfrm>
+          <a:prstGeom prst="diamond">
+            <a:avLst/>
+          </a:prstGeom>
+          <a:solidFill>
+            <a:srgbClr val="0026FF"/>
+          </a:solidFill>
+          <a:ln>
+            <a:solidFill>
+              <a:srgbClr val="0026FF"/>
+            </a:solidFill>
+          </a:ln>
+        </p:spPr>
+        <p:style>
+          <a:lnRef idx="2">
+            <a:schemeClr val="accent1">
+              <a:shade val="50000"/>
+            </a:schemeClr>
+          </a:lnRef>
+          <a:fillRef idx="1">
+            <a:schemeClr val="accent1"/>
+          </a:fillRef>
+          <a:effectRef idx="0">
+            <a:schemeClr val="accent1"/>
+          </a:effectRef>
+          <a:fontRef idx="minor">
+            <a:schemeClr val="lt1"/>
+          </a:fontRef>
+        </p:style>
+        <p:txBody>
+          <a:bodyPr rtlCol="0" anchor="ctr"/>
+          <a:lstStyle/>
+          <a:p>
+            <a:pPr algn="ctr"/>
+            <a:endParaRPr lang="en-US"/>
+          </a:p>
+        </p:txBody>
+      </p:sp>
+      <p:sp>
+        <p:nvSpPr>
+          <p:cNvPr id="11" name="Oval 10">
+            <a:extLst>
+              <a:ext uri="{FF2B5EF4-FFF2-40B4-BE49-F238E27FC236}">
+                <a16:creationId xmlns:a16="http://schemas.microsoft.com/office/drawing/2014/main" id="{4DA6BFBE-ADE3-6F4E-9F2A-B25C5AAB21FD}"/>
+              </a:ext>
+            </a:extLst>
+          </p:cNvPr>
+          <p:cNvSpPr/>
+          <p:nvPr/>
+        </p:nvSpPr>
+        <p:spPr>
+          <a:xfrm>
+            <a:off x="1628571" y="2018888"/>
+            <a:ext cx="146304" cy="146304"/>
+          </a:xfrm>
+          <a:prstGeom prst="ellipse">
+            <a:avLst/>
+          </a:prstGeom>
+          <a:solidFill>
+            <a:srgbClr val="00B0F0"/>
+          </a:solidFill>
+          <a:ln>
+            <a:solidFill>
+              <a:srgbClr val="00B0F0"/>
+            </a:solidFill>
+          </a:ln>
+        </p:spPr>
+        <p:style>
+          <a:lnRef idx="2">
+            <a:schemeClr val="accent1">
+              <a:shade val="50000"/>
+            </a:schemeClr>
+          </a:lnRef>
+          <a:fillRef idx="1">
+            <a:schemeClr val="accent1"/>
+          </a:fillRef>
+          <a:effectRef idx="0">
+            <a:schemeClr val="accent1"/>
+          </a:effectRef>
+          <a:fontRef idx="minor">
+            <a:schemeClr val="lt1"/>
+          </a:fontRef>
+        </p:style>
+        <p:txBody>
+          <a:bodyPr rtlCol="0" anchor="ctr"/>
+          <a:lstStyle/>
+          <a:p>
+            <a:pPr algn="ctr"/>
+            <a:endParaRPr lang="en-US"/>
+          </a:p>
+        </p:txBody>
+      </p:sp>
+      <p:sp>
+        <p:nvSpPr>
+          <p:cNvPr id="14" name="Oval 13">
+            <a:extLst>
+              <a:ext uri="{FF2B5EF4-FFF2-40B4-BE49-F238E27FC236}">
+                <a16:creationId xmlns:a16="http://schemas.microsoft.com/office/drawing/2014/main" id="{C98AB1C6-B39D-0747-AA3A-2C91FFF556B1}"/>
+              </a:ext>
+            </a:extLst>
+          </p:cNvPr>
+          <p:cNvSpPr/>
+          <p:nvPr/>
+        </p:nvSpPr>
+        <p:spPr>
+          <a:xfrm>
+            <a:off x="1628571" y="2243696"/>
+            <a:ext cx="146304" cy="146304"/>
+          </a:xfrm>
+          <a:prstGeom prst="ellipse">
+            <a:avLst/>
+          </a:prstGeom>
+          <a:solidFill>
+            <a:schemeClr val="tx1">
+              <a:lumMod val="50000"/>
+              <a:lumOff val="50000"/>
+            </a:schemeClr>
+          </a:solidFill>
+          <a:ln>
+            <a:solidFill>
+              <a:schemeClr val="tx1">
+                <a:lumMod val="50000"/>
+                <a:lumOff val="50000"/>
+              </a:schemeClr>
+            </a:solidFill>
+          </a:ln>
+        </p:spPr>
+        <p:style>
+          <a:lnRef idx="2">
+            <a:schemeClr val="accent1">
+              <a:shade val="50000"/>
+            </a:schemeClr>
+          </a:lnRef>
+          <a:fillRef idx="1">
+            <a:schemeClr val="accent1"/>
+          </a:fillRef>
+          <a:effectRef idx="0">
+            <a:schemeClr val="accent1"/>
+          </a:effectRef>
+          <a:fontRef idx="minor">
+            <a:schemeClr val="lt1"/>
+          </a:fontRef>
+        </p:style>
+        <p:txBody>
+          <a:bodyPr rtlCol="0" anchor="ctr"/>
+          <a:lstStyle/>
+          <a:p>
+            <a:pPr algn="ctr"/>
+            <a:endParaRPr lang="en-US"/>
+          </a:p>
+        </p:txBody>
+      </p:sp>
+    </p:spTree>
+    <p:extLst>
+      <p:ext uri="{BB962C8B-B14F-4D97-AF65-F5344CB8AC3E}">
+        <p14:creationId xmlns:p14="http://schemas.microsoft.com/office/powerpoint/2010/main" val="4094993666"/>
+      </p:ext>
+    </p:extLst>
+  </p:cSld>
+  <p:clrMapOvr>
+    <a:masterClrMapping/>
+  </p:clrMapOvr>
+</p:sld>
+</file>
+
+<file path=ppt/slides/slide6.xml><?xml version="1.0" encoding="utf-8"?>
+<p:sld xmlns:a="http://schemas.openxmlformats.org/drawingml/2006/main" xmlns:r="http://schemas.openxmlformats.org/officeDocument/2006/relationships" xmlns:p="http://schemas.openxmlformats.org/presentationml/2006/main">
+  <p:cSld>
+    <p:spTree>
+      <p:nvGrpSpPr>
+        <p:cNvPr id="1" name=""/>
+        <p:cNvGrpSpPr/>
+        <p:nvPr/>
+      </p:nvGrpSpPr>
+      <p:grpSpPr>
+        <a:xfrm>
+          <a:off x="0" y="0"/>
+          <a:ext cx="0" cy="0"/>
+          <a:chOff x="0" y="0"/>
+          <a:chExt cx="0" cy="0"/>
+        </a:xfrm>
+      </p:grpSpPr>
+      <p:sp>
+        <p:nvSpPr>
+          <p:cNvPr id="4" name="Rectangle 3">
+            <a:extLst>
+              <a:ext uri="{FF2B5EF4-FFF2-40B4-BE49-F238E27FC236}">
+                <a16:creationId xmlns:a16="http://schemas.microsoft.com/office/drawing/2014/main" id="{B02498ED-DB74-3040-8852-10F2BBB67F7C}"/>
+              </a:ext>
+            </a:extLst>
+          </p:cNvPr>
+          <p:cNvSpPr/>
+          <p:nvPr/>
+        </p:nvSpPr>
+        <p:spPr>
+          <a:xfrm>
+            <a:off x="1489166" y="927463"/>
+            <a:ext cx="770708" cy="1162594"/>
+          </a:xfrm>
+          <a:prstGeom prst="rect">
+            <a:avLst/>
+          </a:prstGeom>
+        </p:spPr>
+        <p:style>
+          <a:lnRef idx="2">
+            <a:schemeClr val="accent1">
+              <a:shade val="50000"/>
+            </a:schemeClr>
+          </a:lnRef>
+          <a:fillRef idx="1">
+            <a:schemeClr val="accent1"/>
+          </a:fillRef>
+          <a:effectRef idx="0">
+            <a:schemeClr val="accent1"/>
+          </a:effectRef>
+          <a:fontRef idx="minor">
+            <a:schemeClr val="lt1"/>
+          </a:fontRef>
+        </p:style>
+        <p:txBody>
+          <a:bodyPr rtlCol="0" anchor="ctr"/>
+          <a:lstStyle/>
+          <a:p>
+            <a:pPr algn="ctr"/>
+            <a:endParaRPr lang="en-US"/>
+          </a:p>
+        </p:txBody>
+      </p:sp>
+      <p:sp>
+        <p:nvSpPr>
+          <p:cNvPr id="5" name="Rectangle 4">
+            <a:extLst>
+              <a:ext uri="{FF2B5EF4-FFF2-40B4-BE49-F238E27FC236}">
+                <a16:creationId xmlns:a16="http://schemas.microsoft.com/office/drawing/2014/main" id="{8322DAE1-9A51-0940-ADA5-469E8F4DC54C}"/>
+              </a:ext>
+            </a:extLst>
+          </p:cNvPr>
+          <p:cNvSpPr/>
+          <p:nvPr/>
+        </p:nvSpPr>
+        <p:spPr>
+          <a:xfrm>
+            <a:off x="1489166" y="2490652"/>
+            <a:ext cx="770708" cy="1162594"/>
+          </a:xfrm>
+          <a:prstGeom prst="rect">
+            <a:avLst/>
+          </a:prstGeom>
+        </p:spPr>
+        <p:style>
+          <a:lnRef idx="2">
+            <a:schemeClr val="accent1">
+              <a:shade val="50000"/>
+            </a:schemeClr>
+          </a:lnRef>
+          <a:fillRef idx="1">
+            <a:schemeClr val="accent1"/>
+          </a:fillRef>
+          <a:effectRef idx="0">
+            <a:schemeClr val="accent1"/>
+          </a:effectRef>
+          <a:fontRef idx="minor">
+            <a:schemeClr val="lt1"/>
+          </a:fontRef>
+        </p:style>
+        <p:txBody>
+          <a:bodyPr rtlCol="0" anchor="ctr"/>
+          <a:lstStyle/>
+          <a:p>
+            <a:pPr algn="ctr"/>
+            <a:endParaRPr lang="en-US"/>
+          </a:p>
+        </p:txBody>
+      </p:sp>
+      <p:sp>
+        <p:nvSpPr>
+          <p:cNvPr id="6" name="Rectangle 5">
+            <a:extLst>
+              <a:ext uri="{FF2B5EF4-FFF2-40B4-BE49-F238E27FC236}">
+                <a16:creationId xmlns:a16="http://schemas.microsoft.com/office/drawing/2014/main" id="{D509C4A8-0B0E-EB46-99C5-A08E0E75C26A}"/>
+              </a:ext>
+            </a:extLst>
+          </p:cNvPr>
+          <p:cNvSpPr/>
+          <p:nvPr/>
+        </p:nvSpPr>
+        <p:spPr>
+          <a:xfrm>
+            <a:off x="1489166" y="3995058"/>
+            <a:ext cx="770708" cy="1162594"/>
+          </a:xfrm>
+          <a:prstGeom prst="rect">
+            <a:avLst/>
+          </a:prstGeom>
+        </p:spPr>
+        <p:style>
+          <a:lnRef idx="2">
+            <a:schemeClr val="accent1">
+              <a:shade val="50000"/>
+            </a:schemeClr>
+          </a:lnRef>
+          <a:fillRef idx="1">
+            <a:schemeClr val="accent1"/>
+          </a:fillRef>
+          <a:effectRef idx="0">
+            <a:schemeClr val="accent1"/>
+          </a:effectRef>
+          <a:fontRef idx="minor">
+            <a:schemeClr val="lt1"/>
+          </a:fontRef>
+        </p:style>
+        <p:txBody>
+          <a:bodyPr rtlCol="0" anchor="ctr"/>
+          <a:lstStyle/>
+          <a:p>
+            <a:pPr algn="ctr"/>
+            <a:endParaRPr lang="en-US"/>
+          </a:p>
+        </p:txBody>
+      </p:sp>
+      <p:sp>
+        <p:nvSpPr>
+          <p:cNvPr id="7" name="Rectangle 6">
+            <a:extLst>
+              <a:ext uri="{FF2B5EF4-FFF2-40B4-BE49-F238E27FC236}">
+                <a16:creationId xmlns:a16="http://schemas.microsoft.com/office/drawing/2014/main" id="{7ED3E44C-DFF3-4049-AD1F-4D176043D005}"/>
+              </a:ext>
+            </a:extLst>
+          </p:cNvPr>
+          <p:cNvSpPr/>
+          <p:nvPr/>
+        </p:nvSpPr>
+        <p:spPr>
+          <a:xfrm>
+            <a:off x="2555966" y="927463"/>
+            <a:ext cx="770708" cy="1162594"/>
+          </a:xfrm>
+          <a:prstGeom prst="rect">
+            <a:avLst/>
+          </a:prstGeom>
+        </p:spPr>
+        <p:style>
+          <a:lnRef idx="2">
+            <a:schemeClr val="accent1">
+              <a:shade val="50000"/>
+            </a:schemeClr>
+          </a:lnRef>
+          <a:fillRef idx="1">
+            <a:schemeClr val="accent1"/>
+          </a:fillRef>
+          <a:effectRef idx="0">
+            <a:schemeClr val="accent1"/>
+          </a:effectRef>
+          <a:fontRef idx="minor">
+            <a:schemeClr val="lt1"/>
+          </a:fontRef>
+        </p:style>
+        <p:txBody>
+          <a:bodyPr rtlCol="0" anchor="ctr"/>
+          <a:lstStyle/>
+          <a:p>
+            <a:pPr algn="ctr"/>
+            <a:endParaRPr lang="en-US"/>
+          </a:p>
+        </p:txBody>
+      </p:sp>
+      <p:sp>
+        <p:nvSpPr>
+          <p:cNvPr id="8" name="Rectangle 7">
+            <a:extLst>
+              <a:ext uri="{FF2B5EF4-FFF2-40B4-BE49-F238E27FC236}">
+                <a16:creationId xmlns:a16="http://schemas.microsoft.com/office/drawing/2014/main" id="{0A4274C6-6CAA-9149-B98A-185F8F6A7DCE}"/>
+              </a:ext>
+            </a:extLst>
+          </p:cNvPr>
+          <p:cNvSpPr/>
+          <p:nvPr/>
+        </p:nvSpPr>
+        <p:spPr>
+          <a:xfrm>
+            <a:off x="2575560" y="2490652"/>
+            <a:ext cx="770708" cy="1162594"/>
+          </a:xfrm>
+          <a:prstGeom prst="rect">
+            <a:avLst/>
+          </a:prstGeom>
+        </p:spPr>
+        <p:style>
+          <a:lnRef idx="2">
+            <a:schemeClr val="accent1">
+              <a:shade val="50000"/>
+            </a:schemeClr>
+          </a:lnRef>
+          <a:fillRef idx="1">
+            <a:schemeClr val="accent1"/>
+          </a:fillRef>
+          <a:effectRef idx="0">
+            <a:schemeClr val="accent1"/>
+          </a:effectRef>
+          <a:fontRef idx="minor">
+            <a:schemeClr val="lt1"/>
+          </a:fontRef>
+        </p:style>
+        <p:txBody>
+          <a:bodyPr rtlCol="0" anchor="ctr"/>
+          <a:lstStyle/>
+          <a:p>
+            <a:pPr algn="ctr"/>
+            <a:endParaRPr lang="en-US"/>
+          </a:p>
+        </p:txBody>
+      </p:sp>
+      <p:sp>
+        <p:nvSpPr>
+          <p:cNvPr id="9" name="Rectangle 8">
+            <a:extLst>
+              <a:ext uri="{FF2B5EF4-FFF2-40B4-BE49-F238E27FC236}">
+                <a16:creationId xmlns:a16="http://schemas.microsoft.com/office/drawing/2014/main" id="{F8855E63-5BF9-B444-B00D-F5203CCB598D}"/>
+              </a:ext>
+            </a:extLst>
+          </p:cNvPr>
+          <p:cNvSpPr/>
+          <p:nvPr/>
+        </p:nvSpPr>
+        <p:spPr>
+          <a:xfrm>
+            <a:off x="2575560" y="3995058"/>
+            <a:ext cx="770708" cy="1162594"/>
+          </a:xfrm>
+          <a:prstGeom prst="rect">
+            <a:avLst/>
+          </a:prstGeom>
+        </p:spPr>
+        <p:style>
+          <a:lnRef idx="2">
+            <a:schemeClr val="accent1">
+              <a:shade val="50000"/>
+            </a:schemeClr>
+          </a:lnRef>
+          <a:fillRef idx="1">
+            <a:schemeClr val="accent1"/>
+          </a:fillRef>
+          <a:effectRef idx="0">
+            <a:schemeClr val="accent1"/>
+          </a:effectRef>
+          <a:fontRef idx="minor">
+            <a:schemeClr val="lt1"/>
+          </a:fontRef>
+        </p:style>
+        <p:txBody>
+          <a:bodyPr rtlCol="0" anchor="ctr"/>
+          <a:lstStyle/>
+          <a:p>
+            <a:pPr algn="ctr"/>
+            <a:endParaRPr lang="en-US"/>
+          </a:p>
+        </p:txBody>
+      </p:sp>
+    </p:spTree>
+    <p:extLst>
+      <p:ext uri="{BB962C8B-B14F-4D97-AF65-F5344CB8AC3E}">
+        <p14:creationId xmlns:p14="http://schemas.microsoft.com/office/powerpoint/2010/main" val="2430343552"/>
+      </p:ext>
+    </p:extLst>
+  </p:cSld>
+  <p:clrMapOvr>
+    <a:masterClrMapping/>
+  </p:clrMapOvr>
+</p:sld>
+</file>
+
 <file path=ppt/theme/theme1.xml><?xml version="1.0" encoding="utf-8"?>
 <a:theme xmlns:a="http://schemas.openxmlformats.org/drawingml/2006/main" name="Office Theme">
   <a:themeElements>

</xml_diff>